<commit_message>
add create update delete JMH benchmark
</commit_message>
<xml_diff>
--- a/presentation/SSM.pptx
+++ b/presentation/SSM.pptx
@@ -19,6 +19,7 @@
     <p:sldId id="264" r:id="rId16"/>
     <p:sldId id="265" r:id="rId17"/>
     <p:sldId id="266" r:id="rId18"/>
+    <p:sldId id="267" r:id="rId19"/>
   </p:sldIdLst>
   <p:sldSz cx="13004800" cy="9753600"/>
   <p:notesSz cx="6858000" cy="9144000"/>
@@ -3114,7 +3115,7 @@
       </p:grpSpPr>
       <p:sp>
         <p:nvSpPr>
-          <p:cNvPr id="171" name="Slide Number"/>
+          <p:cNvPr id="170" name="Slide Number"/>
           <p:cNvSpPr txBox="1"/>
           <p:nvPr>
             <p:ph type="sldNum" sz="quarter" idx="2"/>
@@ -3141,7 +3142,7 @@
       </p:sp>
       <p:grpSp>
         <p:nvGrpSpPr>
-          <p:cNvPr id="174" name="Image Gallery"/>
+          <p:cNvPr id="173" name="Image Gallery"/>
           <p:cNvGrpSpPr/>
           <p:nvPr/>
         </p:nvGrpSpPr>
@@ -3155,7 +3156,7 @@
         </p:grpSpPr>
         <p:pic>
           <p:nvPicPr>
-            <p:cNvPr id="172" name="Delete Contact Diagram.png" descr="Delete Contact Diagram.png"/>
+            <p:cNvPr id="171" name="Delete Contact Diagram.png" descr="Delete Contact Diagram.png"/>
             <p:cNvPicPr>
               <a:picLocks noChangeAspect="1"/>
             </p:cNvPicPr>
@@ -3187,7 +3188,7 @@
         </p:pic>
         <p:sp>
           <p:nvSpPr>
-            <p:cNvPr id="173" name="Delete Contact"/>
+            <p:cNvPr id="172" name="Delete Contact"/>
             <p:cNvSpPr/>
             <p:nvPr/>
           </p:nvSpPr>
@@ -3231,7 +3232,7 @@
       </p:grpSp>
       <p:pic>
         <p:nvPicPr>
-          <p:cNvPr id="175" name="Image" descr="Image"/>
+          <p:cNvPr id="174" name="Image" descr="Image"/>
           <p:cNvPicPr>
             <a:picLocks noChangeAspect="1"/>
           </p:cNvPicPr>
@@ -3286,7 +3287,7 @@
       </p:grpSpPr>
       <p:sp>
         <p:nvSpPr>
-          <p:cNvPr id="177" name="Slide Number"/>
+          <p:cNvPr id="176" name="Slide Number"/>
           <p:cNvSpPr txBox="1"/>
           <p:nvPr>
             <p:ph type="sldNum" sz="quarter" idx="2"/>
@@ -3313,7 +3314,7 @@
       </p:sp>
       <p:sp>
         <p:nvSpPr>
-          <p:cNvPr id="178" name="Benchmark Results"/>
+          <p:cNvPr id="177" name="Benchmark Results"/>
           <p:cNvSpPr txBox="1"/>
           <p:nvPr/>
         </p:nvSpPr>
@@ -3349,7 +3350,7 @@
       </p:sp>
       <p:pic>
         <p:nvPicPr>
-          <p:cNvPr id="179" name="Image" descr="Image"/>
+          <p:cNvPr id="178" name="Image" descr="Image"/>
           <p:cNvPicPr>
             <a:picLocks noChangeAspect="1"/>
           </p:cNvPicPr>
@@ -3378,7 +3379,7 @@
       </p:pic>
       <p:pic>
         <p:nvPicPr>
-          <p:cNvPr id="180" name="Image" descr="Image"/>
+          <p:cNvPr id="179" name="Image" descr="Image"/>
           <p:cNvPicPr>
             <a:picLocks noChangeAspect="1"/>
           </p:cNvPicPr>
@@ -3407,7 +3408,7 @@
       </p:pic>
       <p:pic>
         <p:nvPicPr>
-          <p:cNvPr id="181" name="Image" descr="Image"/>
+          <p:cNvPr id="180" name="Image" descr="Image"/>
           <p:cNvPicPr>
             <a:picLocks noChangeAspect="1"/>
           </p:cNvPicPr>
@@ -3436,7 +3437,7 @@
       </p:pic>
       <p:pic>
         <p:nvPicPr>
-          <p:cNvPr id="182" name="Image" descr="Image"/>
+          <p:cNvPr id="181" name="Image" descr="Image"/>
           <p:cNvPicPr>
             <a:picLocks noChangeAspect="1"/>
           </p:cNvPicPr>
@@ -3465,7 +3466,7 @@
       </p:pic>
       <p:pic>
         <p:nvPicPr>
-          <p:cNvPr id="183" name="Image" descr="Image"/>
+          <p:cNvPr id="182" name="Image" descr="Image"/>
           <p:cNvPicPr>
             <a:picLocks noChangeAspect="1"/>
           </p:cNvPicPr>
@@ -3494,7 +3495,7 @@
       </p:pic>
       <p:pic>
         <p:nvPicPr>
-          <p:cNvPr id="184" name="Image" descr="Image"/>
+          <p:cNvPr id="183" name="Image" descr="Image"/>
           <p:cNvPicPr>
             <a:picLocks noChangeAspect="1"/>
           </p:cNvPicPr>
@@ -3521,6 +3522,95 @@
           </a:ln>
         </p:spPr>
       </p:pic>
+    </p:spTree>
+  </p:cSld>
+  <p:clrMapOvr>
+    <a:masterClrMapping/>
+  </p:clrMapOvr>
+  <p:transition xmlns:p14="http://schemas.microsoft.com/office/powerpoint/2010/main" spd="med" advClick="1"/>
+</p:sld>
+</file>
+
+<file path=ppt/slides/slide12.xml><?xml version="1.0" encoding="utf-8"?>
+<p:sld xmlns:a="http://schemas.openxmlformats.org/drawingml/2006/main" xmlns:r="http://schemas.openxmlformats.org/officeDocument/2006/relationships" xmlns:p="http://schemas.openxmlformats.org/presentationml/2006/main" xmlns:m="http://schemas.openxmlformats.org/officeDocument/2006/math" xmlns:a14="http://schemas.microsoft.com/office/drawing/2010/main" showMasterSp="1" showMasterPhAnim="1">
+  <p:cSld>
+    <p:spTree>
+      <p:nvGrpSpPr>
+        <p:cNvPr id="1" name=""/>
+        <p:cNvGrpSpPr/>
+        <p:nvPr/>
+      </p:nvGrpSpPr>
+      <p:grpSpPr>
+        <a:xfrm>
+          <a:off x="0" y="0"/>
+          <a:ext cx="0" cy="0"/>
+          <a:chOff x="0" y="0"/>
+          <a:chExt cx="0" cy="0"/>
+        </a:xfrm>
+      </p:grpSpPr>
+      <p:sp>
+        <p:nvSpPr>
+          <p:cNvPr id="185" name="Slide Number"/>
+          <p:cNvSpPr txBox="1"/>
+          <p:nvPr>
+            <p:ph type="sldNum" sz="quarter" idx="2"/>
+          </p:nvPr>
+        </p:nvSpPr>
+        <p:spPr>
+          <a:prstGeom prst="rect">
+            <a:avLst/>
+          </a:prstGeom>
+          <a:extLst>
+            <a:ext uri="{C572A759-6A51-4108-AA02-DFA0A04FC94B}">
+              <ma14:wrappingTextBoxFlag xmlns:ma14="http://schemas.microsoft.com/office/mac/drawingml/2011/main" val="1"/>
+            </a:ext>
+          </a:extLst>
+        </p:spPr>
+        <p:txBody>
+          <a:bodyPr/>
+          <a:lstStyle/>
+          <a:p>
+            <a:pPr/>
+            <a:fld id="{86CB4B4D-7CA3-9044-876B-883B54F8677D}" type="slidenum"/>
+          </a:p>
+        </p:txBody>
+      </p:sp>
+      <p:sp>
+        <p:nvSpPr>
+          <p:cNvPr id="186" name="Q&amp;A"/>
+          <p:cNvSpPr txBox="1"/>
+          <p:nvPr/>
+        </p:nvSpPr>
+        <p:spPr>
+          <a:xfrm>
+            <a:off x="6003817" y="4354740"/>
+            <a:ext cx="769011" cy="461059"/>
+          </a:xfrm>
+          <a:prstGeom prst="rect">
+            <a:avLst/>
+          </a:prstGeom>
+          <a:ln w="12700">
+            <a:miter lim="400000"/>
+          </a:ln>
+          <a:extLst>
+            <a:ext uri="{C572A759-6A51-4108-AA02-DFA0A04FC94B}">
+              <ma14:wrappingTextBoxFlag xmlns:ma14="http://schemas.microsoft.com/office/mac/drawingml/2011/main" val="1"/>
+            </a:ext>
+          </a:extLst>
+        </p:spPr>
+        <p:txBody>
+          <a:bodyPr wrap="none" lIns="50800" tIns="50800" rIns="50800" bIns="50800" anchor="ctr">
+            <a:spAutoFit/>
+          </a:bodyPr>
+          <a:lstStyle/>
+          <a:p>
+            <a:pPr/>
+            <a:r>
+              <a:t>Q&amp;A</a:t>
+            </a:r>
+          </a:p>
+        </p:txBody>
+      </p:sp>
     </p:spTree>
   </p:cSld>
   <p:clrMapOvr>
@@ -3622,8 +3712,8 @@
         </p:nvSpPr>
         <p:spPr>
           <a:xfrm>
-            <a:off x="815158" y="1210895"/>
-            <a:ext cx="9549716" cy="5617260"/>
+            <a:off x="853184" y="1699870"/>
+            <a:ext cx="9380247" cy="6353860"/>
           </a:xfrm>
           <a:prstGeom prst="rect">
             <a:avLst/>
@@ -3710,8 +3800,14 @@
               </a:rPr>
               <a:t>https://github.com/popovici-gabriel/contact-service</a:t>
             </a:r>
-            <a:r>
-              <a:t>  </a:t>
+          </a:p>
+          <a:p>
+            <a:pPr lvl="1" marL="777875" indent="-333375" algn="l">
+              <a:buSzPct val="145000"/>
+              <a:buChar char="‣"/>
+            </a:pPr>
+            <a:r>
+              <a:t>IDE plugins: lombok, java micro harness(jmh)  </a:t>
             </a:r>
           </a:p>
           <a:p>
@@ -3783,7 +3879,16 @@
               <a:buChar char="‣"/>
             </a:pPr>
             <a:r>
-              <a:t>Hands-on</a:t>
+              <a:t>Hands-on: Modeling RESTfull APIs using SSM</a:t>
+            </a:r>
+          </a:p>
+          <a:p>
+            <a:pPr lvl="1" marL="777875" indent="-333375" algn="l">
+              <a:buSzPct val="145000"/>
+              <a:buChar char="‣"/>
+            </a:pPr>
+            <a:r>
+              <a:t>Benchmark</a:t>
             </a:r>
           </a:p>
         </p:txBody>
@@ -7141,42 +7246,6 @@
           </a:ln>
         </p:spPr>
       </p:pic>
-      <p:sp>
-        <p:nvSpPr>
-          <p:cNvPr id="151" name="KafkaTemplate"/>
-          <p:cNvSpPr txBox="1"/>
-          <p:nvPr/>
-        </p:nvSpPr>
-        <p:spPr>
-          <a:xfrm>
-            <a:off x="5359247" y="4646270"/>
-            <a:ext cx="2286306" cy="461060"/>
-          </a:xfrm>
-          <a:prstGeom prst="rect">
-            <a:avLst/>
-          </a:prstGeom>
-          <a:ln w="12700">
-            <a:miter lim="400000"/>
-          </a:ln>
-          <a:extLst>
-            <a:ext uri="{C572A759-6A51-4108-AA02-DFA0A04FC94B}">
-              <ma14:wrappingTextBoxFlag xmlns:ma14="http://schemas.microsoft.com/office/mac/drawingml/2011/main" val="1"/>
-            </a:ext>
-          </a:extLst>
-        </p:spPr>
-        <p:txBody>
-          <a:bodyPr wrap="none" lIns="50800" tIns="50800" rIns="50800" bIns="50800" anchor="ctr">
-            <a:spAutoFit/>
-          </a:bodyPr>
-          <a:lstStyle/>
-          <a:p>
-            <a:pPr/>
-            <a:r>
-              <a:t>KafkaTemplate</a:t>
-            </a:r>
-          </a:p>
-        </p:txBody>
-      </p:sp>
     </p:spTree>
   </p:cSld>
   <p:clrMapOvr>
@@ -7205,7 +7274,7 @@
       </p:grpSpPr>
       <p:sp>
         <p:nvSpPr>
-          <p:cNvPr id="153" name="Slide Number"/>
+          <p:cNvPr id="152" name="Slide Number"/>
           <p:cNvSpPr txBox="1"/>
           <p:nvPr>
             <p:ph type="sldNum" sz="quarter" idx="2"/>
@@ -7236,7 +7305,7 @@
       </p:sp>
       <p:sp>
         <p:nvSpPr>
-          <p:cNvPr id="154" name="Why?"/>
+          <p:cNvPr id="153" name="Why?"/>
           <p:cNvSpPr txBox="1"/>
           <p:nvPr/>
         </p:nvSpPr>
@@ -7272,7 +7341,7 @@
       </p:sp>
       <p:sp>
         <p:nvSpPr>
-          <p:cNvPr id="155" name="Traditionally, state machines are added to an existing project when developers realize that the code base is starting to look like a plate full of spaghetti. Spaghetti code looks like a never ending, hierarchical structure of IF, ELSE, and BREAK clauses, and compilers should probably ask developers to go home when things are starting to look too complex."/>
+          <p:cNvPr id="154" name="Traditionally, state machines are added to an existing project when developers realize that the code base is starting to look like a plate full of spaghetti. Spaghetti code looks like a never ending, hierarchical structure of IF, ELSE, and BREAK clauses, and compilers should probably ask developers to go home when things are starting to look too complex."/>
           <p:cNvSpPr txBox="1"/>
           <p:nvPr/>
         </p:nvSpPr>
@@ -7320,7 +7389,7 @@
       </p:sp>
       <p:sp>
         <p:nvSpPr>
-          <p:cNvPr id="156" name="You are already trying to implement a state machine when you:…"/>
+          <p:cNvPr id="155" name="You are already trying to implement a state machine when you:…"/>
           <p:cNvSpPr txBox="1"/>
           <p:nvPr/>
         </p:nvSpPr>
@@ -7473,7 +7542,7 @@
       </p:grpSpPr>
       <p:sp>
         <p:nvSpPr>
-          <p:cNvPr id="158" name="Slide Number"/>
+          <p:cNvPr id="157" name="Slide Number"/>
           <p:cNvSpPr txBox="1"/>
           <p:nvPr>
             <p:ph type="sldNum" sz="quarter" idx="2"/>
@@ -7504,7 +7573,7 @@
       </p:sp>
       <p:sp>
         <p:nvSpPr>
-          <p:cNvPr id="159" name="Hands-on: Modeling RESTfull APIs using SSM"/>
+          <p:cNvPr id="158" name="Hands-on: Modeling RESTfull APIs using SSM"/>
           <p:cNvSpPr txBox="1"/>
           <p:nvPr/>
         </p:nvSpPr>
@@ -7540,7 +7609,7 @@
       </p:sp>
       <p:grpSp>
         <p:nvGrpSpPr>
-          <p:cNvPr id="162" name="Image Gallery"/>
+          <p:cNvPr id="161" name="Image Gallery"/>
           <p:cNvGrpSpPr/>
           <p:nvPr/>
         </p:nvGrpSpPr>
@@ -7554,7 +7623,7 @@
         </p:grpSpPr>
         <p:pic>
           <p:nvPicPr>
-            <p:cNvPr id="160" name="Create Contact Diagram.png" descr="Create Contact Diagram.png"/>
+            <p:cNvPr id="159" name="Create Contact Diagram.png" descr="Create Contact Diagram.png"/>
             <p:cNvPicPr>
               <a:picLocks noChangeAspect="1"/>
             </p:cNvPicPr>
@@ -7586,7 +7655,7 @@
         </p:pic>
         <p:sp>
           <p:nvSpPr>
-            <p:cNvPr id="161" name="Create Contact"/>
+            <p:cNvPr id="160" name="Create Contact"/>
             <p:cNvSpPr/>
             <p:nvPr/>
           </p:nvSpPr>
@@ -7630,7 +7699,7 @@
       </p:grpSp>
       <p:pic>
         <p:nvPicPr>
-          <p:cNvPr id="163" name="Image" descr="Image"/>
+          <p:cNvPr id="162" name="Image" descr="Image"/>
           <p:cNvPicPr>
             <a:picLocks noChangeAspect="1"/>
           </p:cNvPicPr>
@@ -7685,7 +7754,7 @@
       </p:grpSpPr>
       <p:sp>
         <p:nvSpPr>
-          <p:cNvPr id="165" name="Slide Number"/>
+          <p:cNvPr id="164" name="Slide Number"/>
           <p:cNvSpPr txBox="1"/>
           <p:nvPr>
             <p:ph type="sldNum" sz="quarter" idx="2"/>
@@ -7716,7 +7785,7 @@
       </p:sp>
       <p:grpSp>
         <p:nvGrpSpPr>
-          <p:cNvPr id="168" name="Image Gallery"/>
+          <p:cNvPr id="167" name="Image Gallery"/>
           <p:cNvGrpSpPr/>
           <p:nvPr/>
         </p:nvGrpSpPr>
@@ -7730,7 +7799,7 @@
         </p:grpSpPr>
         <p:pic>
           <p:nvPicPr>
-            <p:cNvPr id="166" name="Update Contact Diagram.png" descr="Update Contact Diagram.png"/>
+            <p:cNvPr id="165" name="Update Contact Diagram.png" descr="Update Contact Diagram.png"/>
             <p:cNvPicPr>
               <a:picLocks noChangeAspect="1"/>
             </p:cNvPicPr>
@@ -7762,7 +7831,7 @@
         </p:pic>
         <p:sp>
           <p:nvSpPr>
-            <p:cNvPr id="167" name="Update Contact"/>
+            <p:cNvPr id="166" name="Update Contact"/>
             <p:cNvSpPr/>
             <p:nvPr/>
           </p:nvSpPr>
@@ -7806,7 +7875,7 @@
       </p:grpSp>
       <p:pic>
         <p:nvPicPr>
-          <p:cNvPr id="169" name="Image" descr="Image"/>
+          <p:cNvPr id="168" name="Image" descr="Image"/>
           <p:cNvPicPr>
             <a:picLocks noChangeAspect="1"/>
           </p:cNvPicPr>

</xml_diff>